<commit_message>
Update slide with contact info.
</commit_message>
<xml_diff>
--- a/chef-qa-camp.pptx
+++ b/chef-qa-camp.pptx
@@ -238,7 +238,7 @@
           <a:p>
             <a:fld id="{39FE959F-92CB-2443-9077-5C821098BDA1}" type="datetime1">
               <a:rPr lang="en-US" smtClean="0"/>
-              <a:t>6/18/2018</a:t>
+              <a:t>6/19/2018</a:t>
             </a:fld>
             <a:endParaRPr lang="en-US"/>
           </a:p>
@@ -404,7 +404,7 @@
           <a:p>
             <a:fld id="{73036405-68B7-754E-B8DB-8B02AD361CC1}" type="datetime1">
               <a:rPr lang="en-US" smtClean="0"/>
-              <a:t>6/18/2018</a:t>
+              <a:t>6/19/2018</a:t>
             </a:fld>
             <a:endParaRPr lang="en-US"/>
           </a:p>
@@ -737,7 +737,7 @@
           <a:p>
             <a:fld id="{73036405-68B7-754E-B8DB-8B02AD361CC1}" type="datetime1">
               <a:rPr lang="en-US" smtClean="0"/>
-              <a:t>6/18/2018</a:t>
+              <a:t>6/19/2018</a:t>
             </a:fld>
             <a:endParaRPr lang="en-US" dirty="0"/>
           </a:p>
@@ -823,50 +823,7 @@
           <a:bodyPr/>
           <a:lstStyle/>
           <a:p>
-            <a:r>
-              <a:rPr lang="en-US" dirty="0"/>
-              <a:t>Chef is an infrastructure configuration automation tool.</a:t>
-            </a:r>
-          </a:p>
-          <a:p>
-            <a:r>
-              <a:rPr lang="en-US" dirty="0"/>
-              <a:t>Infrastructure as code treats configuration as a first-class citizen. Better organization than custom scripts.</a:t>
-            </a:r>
-          </a:p>
-          <a:p>
-            <a:r>
-              <a:rPr lang="en-US" dirty="0"/>
-              <a:t>Testable code using </a:t>
-            </a:r>
-            <a:r>
-              <a:rPr lang="en-US" dirty="0" err="1"/>
-              <a:t>ChefSpec</a:t>
-            </a:r>
-            <a:r>
-              <a:rPr lang="en-US" dirty="0"/>
-              <a:t> for unit testing and </a:t>
-            </a:r>
-            <a:r>
-              <a:rPr lang="en-US" dirty="0" err="1"/>
-              <a:t>InSpec</a:t>
-            </a:r>
-            <a:r>
-              <a:rPr lang="en-US" dirty="0"/>
-              <a:t> for integration testing and compliance. Test Kitchen is the test harness provided with Chef. Automated testing for the automation.</a:t>
-            </a:r>
-          </a:p>
-          <a:p>
-            <a:r>
-              <a:rPr lang="en-US" dirty="0"/>
-              <a:t>Compliance means ensuring that nodes with the same configuration are identical.</a:t>
-            </a:r>
-          </a:p>
-          <a:p>
-            <a:r>
-              <a:rPr lang="en-US" dirty="0"/>
-              <a:t>Chef code extends Ruby. Chef code can contain normal Ruby structures.</a:t>
-            </a:r>
+            <a:endParaRPr lang="en-US" dirty="0"/>
           </a:p>
         </p:txBody>
       </p:sp>
@@ -887,7 +844,7 @@
           <a:p>
             <a:fld id="{73036405-68B7-754E-B8DB-8B02AD361CC1}" type="datetime1">
               <a:rPr lang="en-US" smtClean="0"/>
-              <a:t>6/18/2018</a:t>
+              <a:t>6/19/2018</a:t>
             </a:fld>
             <a:endParaRPr lang="en-US"/>
           </a:p>
@@ -1323,7 +1280,7 @@
           <a:p>
             <a:fld id="{73036405-68B7-754E-B8DB-8B02AD361CC1}" type="datetime1">
               <a:rPr lang="en-US" smtClean="0"/>
-              <a:t>6/18/2018</a:t>
+              <a:t>6/19/2018</a:t>
             </a:fld>
             <a:endParaRPr lang="en-US"/>
           </a:p>
@@ -1467,7 +1424,7 @@
           <a:p>
             <a:fld id="{73036405-68B7-754E-B8DB-8B02AD361CC1}" type="datetime1">
               <a:rPr lang="en-US" smtClean="0"/>
-              <a:t>6/18/2018</a:t>
+              <a:t>6/19/2018</a:t>
             </a:fld>
             <a:endParaRPr lang="en-US"/>
           </a:p>
@@ -1710,7 +1667,7 @@
           <a:p>
             <a:fld id="{73036405-68B7-754E-B8DB-8B02AD361CC1}" type="datetime1">
               <a:rPr lang="en-US" smtClean="0"/>
-              <a:t>6/18/2018</a:t>
+              <a:t>6/19/2018</a:t>
             </a:fld>
             <a:endParaRPr lang="en-US"/>
           </a:p>
@@ -7070,12 +7027,6 @@
               <a:t>Experience with Chef since 2016</a:t>
             </a:r>
           </a:p>
-          <a:p>
-            <a:r>
-              <a:rPr lang="en-US" dirty="0"/>
-              <a:t>Previous experience in full stack development; mainly C#</a:t>
-            </a:r>
-          </a:p>
         </p:txBody>
       </p:sp>
       <p:sp>
@@ -7841,6 +7792,34 @@
       </p:grpSpPr>
       <p:sp>
         <p:nvSpPr>
+          <p:cNvPr id="4" name="Title 3">
+            <a:extLst>
+              <a:ext uri="{FF2B5EF4-FFF2-40B4-BE49-F238E27FC236}">
+                <a16:creationId xmlns:a16="http://schemas.microsoft.com/office/drawing/2014/main" id="{F6CBE1BB-3B85-4277-A077-A95B0843161E}"/>
+              </a:ext>
+            </a:extLst>
+          </p:cNvPr>
+          <p:cNvSpPr>
+            <a:spLocks noGrp="1"/>
+          </p:cNvSpPr>
+          <p:nvPr>
+            <p:ph type="title"/>
+          </p:nvPr>
+        </p:nvSpPr>
+        <p:spPr/>
+        <p:txBody>
+          <a:bodyPr/>
+          <a:lstStyle/>
+          <a:p>
+            <a:r>
+              <a:rPr lang="en-US" dirty="0"/>
+              <a:t>Questions?</a:t>
+            </a:r>
+          </a:p>
+        </p:txBody>
+      </p:sp>
+      <p:sp>
+        <p:nvSpPr>
           <p:cNvPr id="2" name="Text Placeholder 1">
             <a:extLst>
               <a:ext uri="{FF2B5EF4-FFF2-40B4-BE49-F238E27FC236}">
@@ -7852,27 +7831,52 @@
             <a:spLocks noGrp="1"/>
           </p:cNvSpPr>
           <p:nvPr>
-            <p:ph type="body" sz="quarter" idx="4294967295"/>
+            <p:ph type="body" sz="quarter" idx="10"/>
           </p:nvPr>
         </p:nvSpPr>
-        <p:spPr>
-          <a:xfrm>
-            <a:off x="3665349" y="2199723"/>
-            <a:ext cx="1813302" cy="744054"/>
-          </a:xfrm>
-        </p:spPr>
+        <p:spPr/>
         <p:txBody>
           <a:bodyPr>
-            <a:normAutofit/>
+            <a:noAutofit/>
           </a:bodyPr>
           <a:lstStyle/>
           <a:p>
             <a:pPr marL="0" indent="0" algn="ctr">
               <a:buNone/>
             </a:pPr>
-            <a:r>
-              <a:rPr lang="en-US" dirty="0"/>
-              <a:t>Questions?</a:t>
+            <a:endParaRPr lang="en-US" sz="3600" dirty="0"/>
+          </a:p>
+          <a:p>
+            <a:pPr marL="0" indent="0" algn="ctr">
+              <a:buNone/>
+            </a:pPr>
+            <a:r>
+              <a:rPr lang="en-US" sz="3600" dirty="0"/>
+              <a:t>https://chef.io</a:t>
+            </a:r>
+          </a:p>
+          <a:p>
+            <a:pPr marL="0" indent="0" algn="ctr">
+              <a:buNone/>
+            </a:pPr>
+            <a:r>
+              <a:rPr lang="en-US" sz="3600" dirty="0"/>
+              <a:t>https://learn.chef.io</a:t>
+            </a:r>
+          </a:p>
+          <a:p>
+            <a:pPr marL="0" indent="0" algn="ctr">
+              <a:buNone/>
+            </a:pPr>
+            <a:endParaRPr lang="en-US" sz="3600" dirty="0"/>
+          </a:p>
+          <a:p>
+            <a:pPr marL="0" indent="0" algn="ctr">
+              <a:buNone/>
+            </a:pPr>
+            <a:r>
+              <a:rPr lang="en-US" sz="2400" dirty="0"/>
+              <a:t>corey.sullivan@centare.com</a:t>
             </a:r>
           </a:p>
         </p:txBody>
@@ -8995,21 +8999,21 @@
 </file>
 
 <file path=customXml/item2.xml><?xml version="1.0" encoding="utf-8"?>
+<p:properties xmlns:p="http://schemas.microsoft.com/office/2006/metadata/properties" xmlns:xsi="http://www.w3.org/2001/XMLSchema-instance" xmlns:pc="http://schemas.microsoft.com/office/infopath/2007/PartnerControls">
+  <documentManagement>
+    <_Version xmlns="http://schemas.microsoft.com/sharepoint/v3/fields" xsi:nil="true"/>
+    <_Status xmlns="http://schemas.microsoft.com/sharepoint/v3/fields">Not Started</_Status>
+  </documentManagement>
+</p:properties>
+</file>
+
+<file path=customXml/item3.xml><?xml version="1.0" encoding="utf-8"?>
 <?mso-contentType ?>
 <FormTemplates xmlns="http://schemas.microsoft.com/sharepoint/v3/contenttype/forms">
   <Display>DocumentLibraryForm</Display>
   <Edit>DocumentLibraryForm</Edit>
   <New>DocumentLibraryForm</New>
 </FormTemplates>
-</file>
-
-<file path=customXml/item3.xml><?xml version="1.0" encoding="utf-8"?>
-<p:properties xmlns:p="http://schemas.microsoft.com/office/2006/metadata/properties" xmlns:xsi="http://www.w3.org/2001/XMLSchema-instance" xmlns:pc="http://schemas.microsoft.com/office/infopath/2007/PartnerControls">
-  <documentManagement>
-    <_Version xmlns="http://schemas.microsoft.com/sharepoint/v3/fields" xsi:nil="true"/>
-    <_Status xmlns="http://schemas.microsoft.com/sharepoint/v3/fields">Not Started</_Status>
-  </documentManagement>
-</p:properties>
 </file>
 
 <file path=customXml/itemProps1.xml><?xml version="1.0" encoding="utf-8"?>
@@ -9031,14 +9035,6 @@
 </file>
 
 <file path=customXml/itemProps2.xml><?xml version="1.0" encoding="utf-8"?>
-<ds:datastoreItem xmlns:ds="http://schemas.openxmlformats.org/officeDocument/2006/customXml" ds:itemID="{87D2A1B0-FF3E-4009-940D-AED0EB70AA20}">
-  <ds:schemaRefs>
-    <ds:schemaRef ds:uri="http://schemas.microsoft.com/sharepoint/v3/contenttype/forms"/>
-  </ds:schemaRefs>
-</ds:datastoreItem>
-</file>
-
-<file path=customXml/itemProps3.xml><?xml version="1.0" encoding="utf-8"?>
 <ds:datastoreItem xmlns:ds="http://schemas.openxmlformats.org/officeDocument/2006/customXml" ds:itemID="{7B6F2769-7194-4217-93D3-3AF3A4742282}">
   <ds:schemaRefs>
     <ds:schemaRef ds:uri="http://purl.org/dc/dcmitype/"/>
@@ -9052,4 +9048,12 @@
     <ds:schemaRef ds:uri="http://www.w3.org/XML/1998/namespace"/>
   </ds:schemaRefs>
 </ds:datastoreItem>
+</file>
+
+<file path=customXml/itemProps3.xml><?xml version="1.0" encoding="utf-8"?>
+<ds:datastoreItem xmlns:ds="http://schemas.openxmlformats.org/officeDocument/2006/customXml" ds:itemID="{87D2A1B0-FF3E-4009-940D-AED0EB70AA20}">
+  <ds:schemaRefs>
+    <ds:schemaRef ds:uri="http://schemas.microsoft.com/sharepoint/v3/contenttype/forms"/>
+  </ds:schemaRefs>
+</ds:datastoreItem>
 </file>
</xml_diff>